<commit_message>
Fix G8.C3.W2 PPTX slide layout issues
- Slide 3: Repositioned white separator line below question text
  (moved from y=2926080 to y=2377440, properly below "whale/ancestors" text)
- Slide 3: Reduced question text box height for better line spacing
- Slide 3: Adjusted "And how does this connect..." and mission box positions
- Slide 4: Reduced title font from 24pt to 20pt to fit on single line,
  preventing overlap with "Variation exists/Selection pressure" boxes
</commit_message>
<xml_diff>
--- a/content/grade8/cycle03/week2/G8_C3_W2_Evidence_Evolution_Slides_Final.pptx
+++ b/content/grade8/cycle03/week2/G8_C3_W2_Evidence_Evolution_Slides_Final.pptx
@@ -9930,8 +9930,8 @@
         </p:nvSpPr>
         <p:spPr>
           <a:xfrm>
-            <a:off x="457200" y="1371600"/>
-            <a:ext cx="8229600" cy="1371600"/>
+            <a:off x="457200" y="1188720"/>
+            <a:ext cx="8229600" cy="1005840"/>
           </a:xfrm>
           <a:prstGeom prst="rect">
             <a:avLst/>
@@ -9970,7 +9970,7 @@
         </p:nvSpPr>
         <p:spPr>
           <a:xfrm>
-            <a:off x="3657600" y="2926080"/>
+            <a:off x="3657600" y="2377440"/>
             <a:ext cx="1828800" cy="73152"/>
           </a:xfrm>
           <a:prstGeom prst="roundRect">
@@ -10013,7 +10013,7 @@
         </p:nvSpPr>
         <p:spPr>
           <a:xfrm>
-            <a:off x="914400" y="3200400"/>
+            <a:off x="914400" y="2560320"/>
             <a:ext cx="7315200" cy="548640"/>
           </a:xfrm>
           <a:prstGeom prst="rect">
@@ -10049,7 +10049,7 @@
         </p:nvSpPr>
         <p:spPr>
           <a:xfrm>
-            <a:off x="1828800" y="3931920"/>
+            <a:off x="1828800" y="3291840"/>
             <a:ext cx="5486400" cy="731520"/>
           </a:xfrm>
           <a:prstGeom prst="roundRect">
@@ -10094,7 +10094,7 @@
         </p:nvSpPr>
         <p:spPr>
           <a:xfrm>
-            <a:off x="2011680" y="4023360"/>
+            <a:off x="2011680" y="3383280"/>
             <a:ext cx="5120640" cy="548640"/>
           </a:xfrm>
           <a:prstGeom prst="rect">
@@ -10163,7 +10163,7 @@
           <a:lstStyle/>
           <a:p>
             <a:pPr algn="ctr">
-              <a:defRPr sz="2400" b="1">
+              <a:defRPr sz="2000" b="1">
                 <a:solidFill>
                   <a:srgbClr val="805AD5"/>
                 </a:solidFill>

</xml_diff>